<commit_message>
updated version sent by Kates
</commit_message>
<xml_diff>
--- a/agenda/2011/LouisKates.pptx
+++ b/agenda/2011/LouisKates.pptx
@@ -10330,7 +10330,7 @@
             <a:fld id="{1310DDE5-AA2C-45D8-BE04-F2D9B45C9A1A}" type="datetimeFigureOut">
               <a:rPr lang="en-CA" smtClean="0"/>
               <a:pPr/>
-              <a:t>28/04/2011</a:t>
+              <a:t>25/05/2011</a:t>
             </a:fld>
             <a:endParaRPr lang="en-CA" dirty="0"/>
           </a:p>
@@ -12296,7 +12296,7 @@
             <a:fld id="{ED71C893-C1F4-41D4-8B14-E2C59F3CFC2C}" type="datetimeFigureOut">
               <a:rPr lang="en-CA" smtClean="0"/>
               <a:pPr/>
-              <a:t>28/04/2011</a:t>
+              <a:t>25/05/2011</a:t>
             </a:fld>
             <a:endParaRPr lang="en-CA" dirty="0"/>
           </a:p>
@@ -12463,7 +12463,7 @@
             <a:fld id="{ED71C893-C1F4-41D4-8B14-E2C59F3CFC2C}" type="datetimeFigureOut">
               <a:rPr lang="en-CA" smtClean="0"/>
               <a:pPr/>
-              <a:t>28/04/2011</a:t>
+              <a:t>25/05/2011</a:t>
             </a:fld>
             <a:endParaRPr lang="en-CA" dirty="0"/>
           </a:p>
@@ -12640,7 +12640,7 @@
             <a:fld id="{ED71C893-C1F4-41D4-8B14-E2C59F3CFC2C}" type="datetimeFigureOut">
               <a:rPr lang="en-CA" smtClean="0"/>
               <a:pPr/>
-              <a:t>28/04/2011</a:t>
+              <a:t>25/05/2011</a:t>
             </a:fld>
             <a:endParaRPr lang="en-CA" dirty="0"/>
           </a:p>
@@ -12807,7 +12807,7 @@
             <a:fld id="{ED71C893-C1F4-41D4-8B14-E2C59F3CFC2C}" type="datetimeFigureOut">
               <a:rPr lang="en-CA" smtClean="0"/>
               <a:pPr/>
-              <a:t>28/04/2011</a:t>
+              <a:t>25/05/2011</a:t>
             </a:fld>
             <a:endParaRPr lang="en-CA" dirty="0"/>
           </a:p>
@@ -13050,7 +13050,7 @@
             <a:fld id="{ED71C893-C1F4-41D4-8B14-E2C59F3CFC2C}" type="datetimeFigureOut">
               <a:rPr lang="en-CA" smtClean="0"/>
               <a:pPr/>
-              <a:t>28/04/2011</a:t>
+              <a:t>25/05/2011</a:t>
             </a:fld>
             <a:endParaRPr lang="en-CA" dirty="0"/>
           </a:p>
@@ -13335,7 +13335,7 @@
             <a:fld id="{ED71C893-C1F4-41D4-8B14-E2C59F3CFC2C}" type="datetimeFigureOut">
               <a:rPr lang="en-CA" smtClean="0"/>
               <a:pPr/>
-              <a:t>28/04/2011</a:t>
+              <a:t>25/05/2011</a:t>
             </a:fld>
             <a:endParaRPr lang="en-CA" dirty="0"/>
           </a:p>
@@ -13754,7 +13754,7 @@
             <a:fld id="{ED71C893-C1F4-41D4-8B14-E2C59F3CFC2C}" type="datetimeFigureOut">
               <a:rPr lang="en-CA" smtClean="0"/>
               <a:pPr/>
-              <a:t>28/04/2011</a:t>
+              <a:t>25/05/2011</a:t>
             </a:fld>
             <a:endParaRPr lang="en-CA" dirty="0"/>
           </a:p>
@@ -13869,7 +13869,7 @@
             <a:fld id="{ED71C893-C1F4-41D4-8B14-E2C59F3CFC2C}" type="datetimeFigureOut">
               <a:rPr lang="en-CA" smtClean="0"/>
               <a:pPr/>
-              <a:t>28/04/2011</a:t>
+              <a:t>25/05/2011</a:t>
             </a:fld>
             <a:endParaRPr lang="en-CA" dirty="0"/>
           </a:p>
@@ -13961,7 +13961,7 @@
             <a:fld id="{ED71C893-C1F4-41D4-8B14-E2C59F3CFC2C}" type="datetimeFigureOut">
               <a:rPr lang="en-CA" smtClean="0"/>
               <a:pPr/>
-              <a:t>28/04/2011</a:t>
+              <a:t>25/05/2011</a:t>
             </a:fld>
             <a:endParaRPr lang="en-CA" dirty="0"/>
           </a:p>
@@ -14235,7 +14235,7 @@
             <a:fld id="{ED71C893-C1F4-41D4-8B14-E2C59F3CFC2C}" type="datetimeFigureOut">
               <a:rPr lang="en-CA" smtClean="0"/>
               <a:pPr/>
-              <a:t>28/04/2011</a:t>
+              <a:t>25/05/2011</a:t>
             </a:fld>
             <a:endParaRPr lang="en-CA" dirty="0"/>
           </a:p>
@@ -14485,7 +14485,7 @@
             <a:fld id="{ED71C893-C1F4-41D4-8B14-E2C59F3CFC2C}" type="datetimeFigureOut">
               <a:rPr lang="en-CA" smtClean="0"/>
               <a:pPr/>
-              <a:t>28/04/2011</a:t>
+              <a:t>25/05/2011</a:t>
             </a:fld>
             <a:endParaRPr lang="en-CA" dirty="0"/>
           </a:p>
@@ -14695,7 +14695,7 @@
             <a:fld id="{ED71C893-C1F4-41D4-8B14-E2C59F3CFC2C}" type="datetimeFigureOut">
               <a:rPr lang="en-CA" smtClean="0"/>
               <a:pPr/>
-              <a:t>28/04/2011</a:t>
+              <a:t>25/05/2011</a:t>
             </a:fld>
             <a:endParaRPr lang="en-CA" dirty="0"/>
           </a:p>
@@ -15088,11 +15088,7 @@
           <a:p>
             <a:r>
               <a:rPr lang="en-CA" dirty="0" smtClean="0"/>
-              <a:t>R and </a:t>
-            </a:r>
-            <a:r>
-              <a:rPr lang="en-CA" dirty="0" smtClean="0"/>
-              <a:t>proto</a:t>
+              <a:t>R and proto</a:t>
             </a:r>
             <a:endParaRPr lang="en-CA" dirty="0"/>
           </a:p>
@@ -17041,15 +17037,7 @@
                     <a:p>
                       <a:r>
                         <a:rPr lang="en-CA" dirty="0" smtClean="0"/>
-                        <a:t>with(p, f</a:t>
-                      </a:r>
-                      <a:r>
-                        <a:rPr lang="en-CA" dirty="0" smtClean="0"/>
-                        <a:t>)(p, </a:t>
-                      </a:r>
-                      <a:r>
-                        <a:rPr lang="en-CA" dirty="0" smtClean="0"/>
-                        <a:t>x)</a:t>
+                        <a:t>with(p, f)(p, x)</a:t>
                       </a:r>
                       <a:endParaRPr lang="en-CA" dirty="0"/>
                     </a:p>
@@ -17093,7 +17081,7 @@
                     <a:p>
                       <a:r>
                         <a:rPr lang="en-CA" dirty="0" smtClean="0"/>
-                        <a:t>ls(e)</a:t>
+                        <a:t>ls(p)</a:t>
                       </a:r>
                       <a:endParaRPr lang="en-CA" dirty="0"/>
                     </a:p>
@@ -17165,19 +17153,7 @@
                     <a:p>
                       <a:r>
                         <a:rPr lang="en-CA" baseline="0" dirty="0" smtClean="0"/>
-                        <a:t>   </a:t>
-                      </a:r>
-                      <a:r>
-                        <a:rPr lang="en-CA" baseline="0" dirty="0" smtClean="0"/>
-                        <a:t>new.env(parent </a:t>
-                      </a:r>
-                      <a:r>
-                        <a:rPr lang="en-CA" baseline="0" dirty="0" smtClean="0"/>
-                        <a:t>= p</a:t>
-                      </a:r>
-                      <a:r>
-                        <a:rPr lang="en-CA" baseline="0" dirty="0" smtClean="0"/>
-                        <a:t>))</a:t>
+                        <a:t>   new.env(parent = p))</a:t>
                       </a:r>
                       <a:endParaRPr lang="en-CA" dirty="0"/>
                     </a:p>
@@ -18228,24 +18204,16 @@
             </a:pPr>
             <a:r>
               <a:rPr lang="en-CA" dirty="0" smtClean="0"/>
-              <a:t>Automatically curried.  Defined with 2 </a:t>
-            </a:r>
+              <a:t>Automatically curried.  Defined with 2 arguments but called </a:t>
+            </a:r>
+          </a:p>
+          <a:p>
+            <a:pPr>
+              <a:buNone/>
+            </a:pPr>
             <a:r>
               <a:rPr lang="en-CA" dirty="0" smtClean="0"/>
-              <a:t>arguments but called </a:t>
-            </a:r>
-          </a:p>
-          <a:p>
-            <a:pPr>
-              <a:buNone/>
-            </a:pPr>
-            <a:r>
-              <a:rPr lang="en-CA" dirty="0" smtClean="0"/>
-              <a:t>with </a:t>
-            </a:r>
-            <a:r>
-              <a:rPr lang="en-CA" dirty="0" smtClean="0"/>
-              <a:t>1:</a:t>
+              <a:t>with 1:</a:t>
             </a:r>
           </a:p>
           <a:p>
@@ -18291,11 +18259,7 @@
             </a:pPr>
             <a:r>
               <a:rPr lang="en-CA" dirty="0" smtClean="0"/>
-              <a:t>      cat("from", this$x, "to", newx, "\n</a:t>
-            </a:r>
-            <a:r>
-              <a:rPr lang="en-CA" dirty="0" smtClean="0"/>
-              <a:t>")</a:t>
+              <a:t>      cat("from", this$x, "to", newx, "\n")</a:t>
             </a:r>
           </a:p>
           <a:p>
@@ -18386,15 +18350,7 @@
           <a:p>
             <a:r>
               <a:rPr lang="en-CA" dirty="0" smtClean="0"/>
-              <a:t>environment(pen2) is</a:t>
-            </a:r>
-            <a:r>
-              <a:rPr lang="en-CA" dirty="0" smtClean="0"/>
-              <a:t> 02af32ac</a:t>
-            </a:r>
-            <a:r>
-              <a:rPr lang="en-CA" dirty="0" smtClean="0"/>
-              <a:t> </a:t>
+              <a:t>environment(pen2) is 02af32ac </a:t>
             </a:r>
             <a:endParaRPr lang="en-CA" dirty="0"/>
           </a:p>
@@ -18437,19 +18393,7 @@
           <a:p>
             <a:r>
               <a:rPr lang="en-CA" dirty="0" smtClean="0"/>
-              <a:t>e</a:t>
-            </a:r>
-            <a:r>
-              <a:rPr lang="en-CA" dirty="0" smtClean="0"/>
-              <a:t>nvironment(pen) is</a:t>
-            </a:r>
-            <a:r>
-              <a:rPr lang="en-CA" dirty="0" smtClean="0"/>
-              <a:t> </a:t>
-            </a:r>
-            <a:r>
-              <a:rPr lang="en-CA" dirty="0" smtClean="0"/>
-              <a:t>02afcb40 </a:t>
+              <a:t>environment(pen) is 02afcb40 </a:t>
             </a:r>
             <a:endParaRPr lang="en-CA" dirty="0"/>
           </a:p>
@@ -18960,11 +18904,7 @@
             </a:r>
             <a:r>
               <a:rPr lang="en-CA" sz="2200" dirty="0" smtClean="0"/>
-              <a:t>(Agesen et al ’92, </a:t>
-            </a:r>
-            <a:r>
-              <a:rPr lang="en-CA" sz="2200" dirty="0" smtClean="0"/>
-              <a:t>SELF manual)</a:t>
+              <a:t>(Agesen et al ’92, SELF manual)</a:t>
             </a:r>
             <a:endParaRPr lang="en-CA" dirty="0" smtClean="0"/>
           </a:p>
@@ -19189,7 +19129,6 @@
               <a:rPr lang="en-CA" sz="2000" b="1" dirty="0" smtClean="0"/>
               <a:t>proto</a:t>
             </a:r>
-            <a:endParaRPr lang="en-CA" sz="2000" b="1" dirty="0" smtClean="0"/>
           </a:p>
           <a:p>
             <a:pPr marL="342900" lvl="0" indent="-342900">
@@ -19199,21 +19138,8 @@
             </a:pPr>
             <a:r>
               <a:rPr lang="en-CA" sz="2000" dirty="0" smtClean="0"/>
-              <a:t>turtle &lt;- </a:t>
-            </a:r>
-            <a:r>
-              <a:rPr lang="en-CA" sz="2000" dirty="0" smtClean="0"/>
-              <a:t>pen$proto(dir </a:t>
-            </a:r>
-            <a:r>
-              <a:rPr lang="en-CA" sz="2000" dirty="0" smtClean="0"/>
-              <a:t>= </a:t>
-            </a:r>
-            <a:r>
-              <a:rPr lang="en-CA" sz="2000" dirty="0" smtClean="0"/>
-              <a:t>1, </a:t>
-            </a:r>
-            <a:endParaRPr lang="en-CA" sz="2000" dirty="0" smtClean="0"/>
+              <a:t>turtle &lt;- pen$proto(dir = 1, </a:t>
+            </a:r>
           </a:p>
           <a:p>
             <a:pPr marL="342900" lvl="0" indent="-342900">
@@ -19223,23 +19149,7 @@
             </a:pPr>
             <a:r>
               <a:rPr lang="en-CA" sz="2000" dirty="0" smtClean="0"/>
-              <a:t>  draw </a:t>
-            </a:r>
-            <a:r>
-              <a:rPr lang="en-CA" sz="2000" dirty="0" smtClean="0"/>
-              <a:t>= </a:t>
-            </a:r>
-            <a:r>
-              <a:rPr lang="en-CA" sz="2000" dirty="0" smtClean="0"/>
-              <a:t>function(this, </a:t>
-            </a:r>
-            <a:r>
-              <a:rPr lang="en-CA" sz="2000" dirty="0" smtClean="0"/>
-              <a:t>d = </a:t>
-            </a:r>
-            <a:r>
-              <a:rPr lang="en-CA" sz="2000" dirty="0" smtClean="0"/>
-              <a:t>1) </a:t>
+              <a:t>  draw = function(this, d = 1) </a:t>
             </a:r>
           </a:p>
           <a:p>
@@ -19250,11 +19160,7 @@
             </a:pPr>
             <a:r>
               <a:rPr lang="en-CA" sz="2000" dirty="0" smtClean="0"/>
-              <a:t> </a:t>
-            </a:r>
-            <a:r>
-              <a:rPr lang="en-CA" sz="2000" dirty="0" smtClean="0"/>
-              <a:t>     .super$draw(this, this$x + d* this$dir)</a:t>
+              <a:t>      .super$draw(this, this$x + d* this$dir)</a:t>
             </a:r>
           </a:p>
           <a:p>
@@ -19276,11 +19182,7 @@
             </a:pPr>
             <a:r>
               <a:rPr lang="en-CA" sz="2000" dirty="0" smtClean="0"/>
-              <a:t>t</a:t>
-            </a:r>
-            <a:r>
-              <a:rPr lang="en-CA" sz="2000" dirty="0" smtClean="0"/>
-              <a:t>urtle$draw(1) # from 0 to 1</a:t>
+              <a:t>turtle$draw(1) # from 0 to 1</a:t>
             </a:r>
           </a:p>
           <a:p>
@@ -19526,7 +19428,7 @@
           <a:p>
             <a:r>
               <a:rPr lang="en-CA" dirty="0" smtClean="0"/>
-              <a:t>.this and .super automatically inserted into turtle</a:t>
+              <a:t>.that and .super automatically inserted into turtle</a:t>
             </a:r>
             <a:endParaRPr lang="en-CA" dirty="0"/>
           </a:p>
@@ -19596,7 +19498,7 @@
             </a:pPr>
             <a:r>
               <a:rPr lang="en-CA" dirty="0" smtClean="0"/>
-              <a:t>   .this &lt;- environment(); .super &lt;- parent.env(.this)</a:t>
+              <a:t>   .that &lt;- environment(); .super &lt;- parent.env(.this)</a:t>
             </a:r>
           </a:p>
           <a:p>
@@ -19758,11 +19660,7 @@
           <a:p>
             <a:r>
               <a:rPr lang="en-CA" dirty="0" smtClean="0"/>
-              <a:t>General </a:t>
-            </a:r>
-            <a:r>
-              <a:rPr lang="en-CA" dirty="0" smtClean="0"/>
-              <a:t>container objects</a:t>
+              <a:t>General container objects</a:t>
             </a:r>
           </a:p>
           <a:p>
@@ -19770,7 +19668,6 @@
               <a:rPr lang="en-CA" dirty="0" smtClean="0"/>
               <a:t>Logging</a:t>
             </a:r>
-            <a:endParaRPr lang="en-CA" dirty="0" smtClean="0"/>
           </a:p>
           <a:p>
             <a:pPr>
@@ -19861,26 +19758,17 @@
             </a:pPr>
             <a:r>
               <a:rPr lang="en-CA" dirty="0" smtClean="0"/>
-              <a:t>library(proto</a:t>
-            </a:r>
+              <a:t>library(proto)</a:t>
+            </a:r>
+          </a:p>
+          <a:p>
+            <a:pPr>
+              <a:buNone/>
+            </a:pPr>
             <a:r>
               <a:rPr lang="en-CA" dirty="0" smtClean="0"/>
-              <a:t>)</a:t>
-            </a:r>
-          </a:p>
-          <a:p>
-            <a:pPr>
-              <a:buNone/>
-            </a:pPr>
-            <a:r>
-              <a:rPr lang="en-CA" dirty="0" smtClean="0"/>
-              <a:t>library(gWidgets</a:t>
-            </a:r>
-            <a:r>
-              <a:rPr lang="en-CA" dirty="0" smtClean="0"/>
-              <a:t>)</a:t>
-            </a:r>
-            <a:endParaRPr lang="en-CA" dirty="0" smtClean="0"/>
+              <a:t>library(gWidgets)</a:t>
+            </a:r>
           </a:p>
           <a:p>
             <a:pPr>
@@ -19894,15 +19782,7 @@
             </a:pPr>
             <a:r>
               <a:rPr lang="en-CA" dirty="0" smtClean="0"/>
-              <a:t>p </a:t>
-            </a:r>
-            <a:r>
-              <a:rPr lang="en-CA" dirty="0" smtClean="0"/>
-              <a:t>&lt;- proto</a:t>
-            </a:r>
-            <a:r>
-              <a:rPr lang="en-CA" dirty="0" smtClean="0"/>
-              <a:t>(</a:t>
+              <a:t>p &lt;- proto(</a:t>
             </a:r>
           </a:p>
           <a:p>
@@ -19917,8 +19797,13 @@
                   </a:schemeClr>
                 </a:solidFill>
               </a:rPr>
-              <a:t> </a:t>
-            </a:r>
+              <a:t>    go = function(this) {</a:t>
+            </a:r>
+          </a:p>
+          <a:p>
+            <a:pPr>
+              <a:buNone/>
+            </a:pPr>
             <a:r>
               <a:rPr lang="en-CA" dirty="0" smtClean="0">
                 <a:solidFill>
@@ -19927,8 +19812,13 @@
                   </a:schemeClr>
                 </a:solidFill>
               </a:rPr>
-              <a:t>   go </a:t>
-            </a:r>
+              <a:t>	w &lt;- gwindow(); g &lt;- ggroup(container = w)</a:t>
+            </a:r>
+          </a:p>
+          <a:p>
+            <a:pPr>
+              <a:buNone/>
+            </a:pPr>
             <a:r>
               <a:rPr lang="en-CA" dirty="0" smtClean="0">
                 <a:solidFill>
@@ -19937,8 +19827,13 @@
                   </a:schemeClr>
                 </a:solidFill>
               </a:rPr>
-              <a:t>= </a:t>
-            </a:r>
+              <a:t>	g.i &lt;- ggroup(horizontal=FALSE, container = g) </a:t>
+            </a:r>
+          </a:p>
+          <a:p>
+            <a:pPr>
+              <a:buNone/>
+            </a:pPr>
             <a:r>
               <a:rPr lang="en-CA" dirty="0" smtClean="0">
                 <a:solidFill>
@@ -19947,8 +19842,13 @@
                   </a:schemeClr>
                 </a:solidFill>
               </a:rPr>
-              <a:t>function(this) </a:t>
-            </a:r>
+              <a:t>       glabel(this$msg, container = g.i, expand = TRUE)</a:t>
+            </a:r>
+          </a:p>
+          <a:p>
+            <a:pPr>
+              <a:buNone/>
+            </a:pPr>
             <a:r>
               <a:rPr lang="en-CA" dirty="0" smtClean="0">
                 <a:solidFill>
@@ -19957,7 +19857,7 @@
                   </a:schemeClr>
                 </a:solidFill>
               </a:rPr>
-              <a:t>{</a:t>
+              <a:t>	g.i.b &lt;- ggroup(container = g.i); addSpring(g.i.b)</a:t>
             </a:r>
           </a:p>
           <a:p>
@@ -19972,8 +19872,13 @@
                   </a:schemeClr>
                 </a:solidFill>
               </a:rPr>
-              <a:t>	w &lt;- gwindow</a:t>
-            </a:r>
+              <a:t>	gbutton("ok", handler = with(this, handler), action = this, container = g.i.b)</a:t>
+            </a:r>
+          </a:p>
+          <a:p>
+            <a:pPr>
+              <a:buNone/>
+            </a:pPr>
             <a:r>
               <a:rPr lang="en-CA" dirty="0" smtClean="0">
                 <a:solidFill>
@@ -19982,222 +19887,7 @@
                   </a:schemeClr>
                 </a:solidFill>
               </a:rPr>
-              <a:t>(); g </a:t>
-            </a:r>
-            <a:r>
-              <a:rPr lang="en-CA" dirty="0" smtClean="0">
-                <a:solidFill>
-                  <a:schemeClr val="bg1">
-                    <a:lumMod val="50000"/>
-                  </a:schemeClr>
-                </a:solidFill>
-              </a:rPr>
-              <a:t>&lt;- ggroup(container = w)</a:t>
-            </a:r>
-          </a:p>
-          <a:p>
-            <a:pPr>
-              <a:buNone/>
-            </a:pPr>
-            <a:r>
-              <a:rPr lang="en-CA" dirty="0" smtClean="0">
-                <a:solidFill>
-                  <a:schemeClr val="bg1">
-                    <a:lumMod val="50000"/>
-                  </a:schemeClr>
-                </a:solidFill>
-              </a:rPr>
-              <a:t>	g.i &lt;- ggroup(horizontal=FALSE, container = g</a:t>
-            </a:r>
-            <a:r>
-              <a:rPr lang="en-CA" dirty="0" smtClean="0">
-                <a:solidFill>
-                  <a:schemeClr val="bg1">
-                    <a:lumMod val="50000"/>
-                  </a:schemeClr>
-                </a:solidFill>
-              </a:rPr>
-              <a:t>) </a:t>
-            </a:r>
-          </a:p>
-          <a:p>
-            <a:pPr>
-              <a:buNone/>
-            </a:pPr>
-            <a:r>
-              <a:rPr lang="en-CA" dirty="0" smtClean="0">
-                <a:solidFill>
-                  <a:schemeClr val="bg1">
-                    <a:lumMod val="50000"/>
-                  </a:schemeClr>
-                </a:solidFill>
-              </a:rPr>
-              <a:t> </a:t>
-            </a:r>
-            <a:r>
-              <a:rPr lang="en-CA" dirty="0" smtClean="0">
-                <a:solidFill>
-                  <a:schemeClr val="bg1">
-                    <a:lumMod val="50000"/>
-                  </a:schemeClr>
-                </a:solidFill>
-              </a:rPr>
-              <a:t>      glabel(this$msg</a:t>
-            </a:r>
-            <a:r>
-              <a:rPr lang="en-CA" dirty="0" smtClean="0">
-                <a:solidFill>
-                  <a:schemeClr val="bg1">
-                    <a:lumMod val="50000"/>
-                  </a:schemeClr>
-                </a:solidFill>
-              </a:rPr>
-              <a:t>, container = g.i, expand = TRUE)</a:t>
-            </a:r>
-          </a:p>
-          <a:p>
-            <a:pPr>
-              <a:buNone/>
-            </a:pPr>
-            <a:r>
-              <a:rPr lang="en-CA" dirty="0" smtClean="0">
-                <a:solidFill>
-                  <a:schemeClr val="bg1">
-                    <a:lumMod val="50000"/>
-                  </a:schemeClr>
-                </a:solidFill>
-              </a:rPr>
-              <a:t>	g.i.b </a:t>
-            </a:r>
-            <a:r>
-              <a:rPr lang="en-CA" dirty="0" smtClean="0">
-                <a:solidFill>
-                  <a:schemeClr val="bg1">
-                    <a:lumMod val="50000"/>
-                  </a:schemeClr>
-                </a:solidFill>
-              </a:rPr>
-              <a:t>&lt;- </a:t>
-            </a:r>
-            <a:r>
-              <a:rPr lang="en-CA" dirty="0" smtClean="0">
-                <a:solidFill>
-                  <a:schemeClr val="bg1">
-                    <a:lumMod val="50000"/>
-                  </a:schemeClr>
-                </a:solidFill>
-              </a:rPr>
-              <a:t>ggroup(container = g.i</a:t>
-            </a:r>
-            <a:r>
-              <a:rPr lang="en-CA" dirty="0" smtClean="0">
-                <a:solidFill>
-                  <a:schemeClr val="bg1">
-                    <a:lumMod val="50000"/>
-                  </a:schemeClr>
-                </a:solidFill>
-              </a:rPr>
-              <a:t>); addSpring(g.i.b</a:t>
-            </a:r>
-            <a:r>
-              <a:rPr lang="en-CA" dirty="0" smtClean="0">
-                <a:solidFill>
-                  <a:schemeClr val="bg1">
-                    <a:lumMod val="50000"/>
-                  </a:schemeClr>
-                </a:solidFill>
-              </a:rPr>
-              <a:t>)</a:t>
-            </a:r>
-          </a:p>
-          <a:p>
-            <a:pPr>
-              <a:buNone/>
-            </a:pPr>
-            <a:r>
-              <a:rPr lang="en-CA" dirty="0" smtClean="0">
-                <a:solidFill>
-                  <a:schemeClr val="bg1">
-                    <a:lumMod val="50000"/>
-                  </a:schemeClr>
-                </a:solidFill>
-              </a:rPr>
-              <a:t>	gbutton("ok", handler = </a:t>
-            </a:r>
-            <a:r>
-              <a:rPr lang="en-CA" dirty="0" smtClean="0">
-                <a:solidFill>
-                  <a:schemeClr val="bg1">
-                    <a:lumMod val="50000"/>
-                  </a:schemeClr>
-                </a:solidFill>
-              </a:rPr>
-              <a:t>with(this, </a:t>
-            </a:r>
-            <a:r>
-              <a:rPr lang="en-CA" dirty="0" smtClean="0">
-                <a:solidFill>
-                  <a:schemeClr val="bg1">
-                    <a:lumMod val="50000"/>
-                  </a:schemeClr>
-                </a:solidFill>
-              </a:rPr>
-              <a:t>handler), action = </a:t>
-            </a:r>
-            <a:r>
-              <a:rPr lang="en-CA" dirty="0" smtClean="0">
-                <a:solidFill>
-                  <a:schemeClr val="bg1">
-                    <a:lumMod val="50000"/>
-                  </a:schemeClr>
-                </a:solidFill>
-              </a:rPr>
-              <a:t>this, </a:t>
-            </a:r>
-            <a:r>
-              <a:rPr lang="en-CA" dirty="0" smtClean="0">
-                <a:solidFill>
-                  <a:schemeClr val="bg1">
-                    <a:lumMod val="50000"/>
-                  </a:schemeClr>
-                </a:solidFill>
-              </a:rPr>
-              <a:t>container = g.i.b)</a:t>
-            </a:r>
-          </a:p>
-          <a:p>
-            <a:pPr>
-              <a:buNone/>
-            </a:pPr>
-            <a:r>
-              <a:rPr lang="en-CA" dirty="0" smtClean="0">
-                <a:solidFill>
-                  <a:schemeClr val="bg1">
-                    <a:lumMod val="50000"/>
-                  </a:schemeClr>
-                </a:solidFill>
-              </a:rPr>
-              <a:t>	gbutton("cancel", handler = function(h, ...) dispose(w</a:t>
-            </a:r>
-            <a:r>
-              <a:rPr lang="en-CA" dirty="0" smtClean="0">
-                <a:solidFill>
-                  <a:schemeClr val="bg1">
-                    <a:lumMod val="50000"/>
-                  </a:schemeClr>
-                </a:solidFill>
-              </a:rPr>
-              <a:t>), container </a:t>
-            </a:r>
-            <a:r>
-              <a:rPr lang="en-CA" dirty="0" smtClean="0">
-                <a:solidFill>
-                  <a:schemeClr val="bg1">
-                    <a:lumMod val="50000"/>
-                  </a:schemeClr>
-                </a:solidFill>
-              </a:rPr>
-              <a:t>= g.i.b)</a:t>
+              <a:t>	gbutton("cancel", handler = function(h, ...) dispose(w), container = g.i.b)</a:t>
             </a:r>
           </a:p>
           <a:p>
@@ -20214,13 +19904,6 @@
               </a:rPr>
               <a:t>  },</a:t>
             </a:r>
-            <a:endParaRPr lang="en-CA" dirty="0" smtClean="0">
-              <a:solidFill>
-                <a:schemeClr val="bg1">
-                  <a:lumMod val="50000"/>
-                </a:schemeClr>
-              </a:solidFill>
-            </a:endParaRPr>
           </a:p>
           <a:p>
             <a:pPr>
@@ -20234,37 +19917,7 @@
                   </a:schemeClr>
                 </a:solidFill>
               </a:rPr>
-              <a:t> </a:t>
-            </a:r>
-            <a:r>
-              <a:rPr lang="en-CA" dirty="0" smtClean="0">
-                <a:solidFill>
-                  <a:schemeClr val="bg1">
-                    <a:lumMod val="50000"/>
-                  </a:schemeClr>
-                </a:solidFill>
-              </a:rPr>
-              <a:t> handler </a:t>
-            </a:r>
-            <a:r>
-              <a:rPr lang="en-CA" dirty="0" smtClean="0">
-                <a:solidFill>
-                  <a:schemeClr val="bg1">
-                    <a:lumMod val="50000"/>
-                  </a:schemeClr>
-                </a:solidFill>
-              </a:rPr>
-              <a:t>= function(h, ...) { cat("\n", h$action$msg, "\n"); dispose(h$obj) </a:t>
-            </a:r>
-            <a:r>
-              <a:rPr lang="en-CA" dirty="0" smtClean="0">
-                <a:solidFill>
-                  <a:schemeClr val="bg1">
-                    <a:lumMod val="50000"/>
-                  </a:schemeClr>
-                </a:solidFill>
-              </a:rPr>
-              <a:t>},</a:t>
+              <a:t>  handler = function(h, ...) { cat("\n", h$action$msg, "\n"); dispose(h$obj) },</a:t>
             </a:r>
           </a:p>
           <a:p>
@@ -20277,7 +19930,25 @@
                   <a:srgbClr val="0070C0"/>
                 </a:solidFill>
               </a:rPr>
-              <a:t>  msg </a:t>
+              <a:t>  msg = "Hello"</a:t>
+            </a:r>
+          </a:p>
+          <a:p>
+            <a:pPr>
+              <a:buNone/>
+            </a:pPr>
+            <a:r>
+              <a:rPr lang="en-CA" dirty="0" smtClean="0"/>
+              <a:t>)</a:t>
+            </a:r>
+          </a:p>
+          <a:p>
+            <a:pPr>
+              <a:buNone/>
+            </a:pPr>
+            <a:r>
+              <a:rPr lang="en-CA" dirty="0" smtClean="0"/>
+              <a:t>ch &lt;- p$proto(</a:t>
             </a:r>
             <a:r>
               <a:rPr lang="en-CA" dirty="0" smtClean="0">
@@ -20285,61 +19956,8 @@
                   <a:srgbClr val="0070C0"/>
                 </a:solidFill>
               </a:rPr>
-              <a:t>= "Hello</a:t>
-            </a:r>
-            <a:r>
-              <a:rPr lang="en-CA" dirty="0" smtClean="0">
-                <a:solidFill>
-                  <a:srgbClr val="0070C0"/>
-                </a:solidFill>
-              </a:rPr>
-              <a:t>"</a:t>
-            </a:r>
-            <a:endParaRPr lang="en-CA" dirty="0" smtClean="0">
-              <a:solidFill>
-                <a:srgbClr val="0070C0"/>
-              </a:solidFill>
-            </a:endParaRPr>
-          </a:p>
-          <a:p>
-            <a:pPr>
-              <a:buNone/>
-            </a:pPr>
-            <a:r>
-              <a:rPr lang="en-CA" dirty="0" smtClean="0"/>
-              <a:t>)</a:t>
-            </a:r>
-            <a:endParaRPr lang="en-CA" dirty="0" smtClean="0"/>
-          </a:p>
-          <a:p>
-            <a:pPr>
-              <a:buNone/>
-            </a:pPr>
-            <a:r>
-              <a:rPr lang="en-CA" dirty="0" smtClean="0"/>
-              <a:t>ch &lt;- p$proto(</a:t>
-            </a:r>
-            <a:r>
-              <a:rPr lang="en-CA" dirty="0" smtClean="0">
-                <a:solidFill>
-                  <a:srgbClr val="0070C0"/>
-                </a:solidFill>
-              </a:rPr>
-              <a:t>msg = "</a:t>
-            </a:r>
-            <a:r>
-              <a:rPr lang="en-CA" dirty="0" smtClean="0">
-                <a:solidFill>
-                  <a:srgbClr val="0070C0"/>
-                </a:solidFill>
-              </a:rPr>
-              <a:t>Hi")</a:t>
-            </a:r>
-            <a:endParaRPr lang="en-CA" dirty="0" smtClean="0">
-              <a:solidFill>
-                <a:srgbClr val="0070C0"/>
-              </a:solidFill>
-            </a:endParaRPr>
+              <a:t>msg = "Hi")</a:t>
+            </a:r>
           </a:p>
           <a:p>
             <a:pPr>
@@ -20355,21 +19973,8 @@
                   <a:srgbClr val="FF0000"/>
                 </a:solidFill>
               </a:rPr>
-              <a:t># press ok </a:t>
-            </a:r>
-            <a:r>
-              <a:rPr lang="en-CA" dirty="0" smtClean="0">
-                <a:solidFill>
-                  <a:srgbClr val="FF0000"/>
-                </a:solidFill>
-              </a:rPr>
-              <a:t>button on generated GUI &amp; on R console we see:  Hi </a:t>
-            </a:r>
-            <a:endParaRPr lang="en-CA" dirty="0" smtClean="0">
-              <a:solidFill>
-                <a:srgbClr val="FF0000"/>
-              </a:solidFill>
-            </a:endParaRPr>
+              <a:t># press ok button on generated GUI &amp; on R console we see:  Hi </a:t>
+            </a:r>
           </a:p>
           <a:p>
             <a:pPr>
@@ -20493,11 +20098,7 @@
             </a:pPr>
             <a:r>
               <a:rPr lang="en-CA" dirty="0" smtClean="0"/>
-              <a:t> </a:t>
-            </a:r>
-            <a:r>
-              <a:rPr lang="en-CA" dirty="0" smtClean="0"/>
-              <a:t>   The fun method accepts the match and produces the replacement.  It can use the properties of the proto object to carry state between function invocations.</a:t>
+              <a:t>    The fun method accepts the match and produces the replacement.  It can use the properties of the proto object to carry state between function invocations.</a:t>
             </a:r>
           </a:p>
           <a:p>
@@ -20590,11 +20191,7 @@
             </a:pPr>
             <a:r>
               <a:rPr lang="en-CA" sz="2400" dirty="0" smtClean="0"/>
-              <a:t>[1] "12 15 26, 51 </a:t>
-            </a:r>
-            <a:r>
-              <a:rPr lang="en-CA" sz="2400" dirty="0" smtClean="0"/>
-              <a:t>60”</a:t>
+              <a:t>[1] "12 15 26, 51 60”</a:t>
             </a:r>
             <a:endParaRPr lang="en-CA" sz="2400" dirty="0"/>
           </a:p>

</xml_diff>